<commit_message>
save point till feature modules concept
</commit_message>
<xml_diff>
--- a/Angular Intermediate Level Training PPT.pptx
+++ b/Angular Intermediate Level Training PPT.pptx
@@ -6,11 +6,16 @@
   </p:sldMasterIdLst>
   <p:sldIdLst>
     <p:sldId id="256" r:id="rId2"/>
-    <p:sldId id="257" r:id="rId3"/>
-    <p:sldId id="258" r:id="rId4"/>
-    <p:sldId id="259" r:id="rId5"/>
-    <p:sldId id="260" r:id="rId6"/>
-    <p:sldId id="261" r:id="rId7"/>
+    <p:sldId id="262" r:id="rId3"/>
+    <p:sldId id="263" r:id="rId4"/>
+    <p:sldId id="265" r:id="rId5"/>
+    <p:sldId id="264" r:id="rId6"/>
+    <p:sldId id="266" r:id="rId7"/>
+    <p:sldId id="267" r:id="rId8"/>
+    <p:sldId id="258" r:id="rId9"/>
+    <p:sldId id="259" r:id="rId10"/>
+    <p:sldId id="260" r:id="rId11"/>
+    <p:sldId id="261" r:id="rId12"/>
   </p:sldIdLst>
   <p:sldSz cx="12192000" cy="6858000"/>
   <p:notesSz cx="6858000" cy="9144000"/>
@@ -109,6 +114,11 @@
       </a:defRPr>
     </a:lvl9pPr>
   </p:defaultTextStyle>
+  <p:extLst>
+    <p:ext uri="{EFAFB233-063F-42B5-8137-9DF3F51BA10A}">
+      <p15:sldGuideLst xmlns:p15="http://schemas.microsoft.com/office/powerpoint/2012/main"/>
+    </p:ext>
+  </p:extLst>
 </p:presentation>
 </file>
 
@@ -3043,6 +3053,420 @@
 </p:sld>
 </file>
 
+<file path=ppt/slides/slide10.xml><?xml version="1.0" encoding="utf-8"?>
+<p:sld xmlns:a="http://schemas.openxmlformats.org/drawingml/2006/main" xmlns:r="http://schemas.openxmlformats.org/officeDocument/2006/relationships" xmlns:p="http://schemas.openxmlformats.org/presentationml/2006/main">
+  <p:cSld>
+    <p:spTree>
+      <p:nvGrpSpPr>
+        <p:cNvPr id="1" name=""/>
+        <p:cNvGrpSpPr/>
+        <p:nvPr/>
+      </p:nvGrpSpPr>
+      <p:grpSpPr>
+        <a:xfrm>
+          <a:off x="0" y="0"/>
+          <a:ext cx="0" cy="0"/>
+          <a:chOff x="0" y="0"/>
+          <a:chExt cx="0" cy="0"/>
+        </a:xfrm>
+      </p:grpSpPr>
+      <p:sp>
+        <p:nvSpPr>
+          <p:cNvPr id="2" name="Title 1"/>
+          <p:cNvSpPr>
+            <a:spLocks noGrp="1"/>
+          </p:cNvSpPr>
+          <p:nvPr>
+            <p:ph type="title"/>
+          </p:nvPr>
+        </p:nvSpPr>
+        <p:spPr/>
+        <p:txBody>
+          <a:bodyPr/>
+          <a:lstStyle/>
+          <a:p>
+            <a:r>
+              <a:rPr lang="en-US" dirty="0" smtClean="0"/>
+              <a:t>Types of Modules</a:t>
+            </a:r>
+            <a:endParaRPr lang="en-US" dirty="0"/>
+          </a:p>
+        </p:txBody>
+      </p:sp>
+      <p:sp>
+        <p:nvSpPr>
+          <p:cNvPr id="3" name="Content Placeholder 2"/>
+          <p:cNvSpPr>
+            <a:spLocks noGrp="1"/>
+          </p:cNvSpPr>
+          <p:nvPr>
+            <p:ph idx="1"/>
+          </p:nvPr>
+        </p:nvSpPr>
+        <p:spPr/>
+        <p:txBody>
+          <a:bodyPr/>
+          <a:lstStyle/>
+          <a:p>
+            <a:endParaRPr lang="en-US" dirty="0"/>
+          </a:p>
+          <a:p>
+            <a:endParaRPr lang="en-US" dirty="0" smtClean="0"/>
+          </a:p>
+          <a:p>
+            <a:pPr marL="0" indent="0">
+              <a:buNone/>
+            </a:pPr>
+            <a:endParaRPr lang="en-US" dirty="0"/>
+          </a:p>
+        </p:txBody>
+      </p:sp>
+      <p:sp>
+        <p:nvSpPr>
+          <p:cNvPr id="4" name="TextBox 3"/>
+          <p:cNvSpPr txBox="1"/>
+          <p:nvPr/>
+        </p:nvSpPr>
+        <p:spPr>
+          <a:xfrm>
+            <a:off x="5409125" y="1918952"/>
+            <a:ext cx="4082603" cy="2544286"/>
+          </a:xfrm>
+          <a:prstGeom prst="rect">
+            <a:avLst/>
+          </a:prstGeom>
+          <a:noFill/>
+        </p:spPr>
+        <p:txBody>
+          <a:bodyPr wrap="square" rtlCol="0">
+            <a:spAutoFit/>
+          </a:bodyPr>
+          <a:lstStyle/>
+          <a:p>
+            <a:pPr marL="228600" lvl="0" indent="-228600">
+              <a:lnSpc>
+                <a:spcPct val="90000"/>
+              </a:lnSpc>
+              <a:spcBef>
+                <a:spcPts val="1000"/>
+              </a:spcBef>
+              <a:buFont typeface="Arial" panose="020B0604020202020204" pitchFamily="34" charset="0"/>
+              <a:buChar char="•"/>
+            </a:pPr>
+            <a:r>
+              <a:rPr lang="en-US" sz="2800" dirty="0">
+                <a:solidFill>
+                  <a:prstClr val="black"/>
+                </a:solidFill>
+              </a:rPr>
+              <a:t>Routing </a:t>
+            </a:r>
+            <a:r>
+              <a:rPr lang="en-US" sz="2800" dirty="0" smtClean="0">
+                <a:solidFill>
+                  <a:prstClr val="black"/>
+                </a:solidFill>
+              </a:rPr>
+              <a:t>Modules</a:t>
+            </a:r>
+          </a:p>
+          <a:p>
+            <a:pPr lvl="0">
+              <a:lnSpc>
+                <a:spcPct val="90000"/>
+              </a:lnSpc>
+              <a:spcBef>
+                <a:spcPts val="1000"/>
+              </a:spcBef>
+            </a:pPr>
+            <a:r>
+              <a:rPr lang="en-US" sz="2800" dirty="0" smtClean="0">
+                <a:solidFill>
+                  <a:prstClr val="black"/>
+                </a:solidFill>
+              </a:rPr>
+              <a:t> </a:t>
+            </a:r>
+            <a:endParaRPr lang="en-US" sz="2800" dirty="0">
+              <a:solidFill>
+                <a:prstClr val="black"/>
+              </a:solidFill>
+            </a:endParaRPr>
+          </a:p>
+          <a:p>
+            <a:pPr marL="228600" lvl="0" indent="-228600">
+              <a:lnSpc>
+                <a:spcPct val="90000"/>
+              </a:lnSpc>
+              <a:spcBef>
+                <a:spcPts val="1000"/>
+              </a:spcBef>
+              <a:buFont typeface="Arial" panose="020B0604020202020204" pitchFamily="34" charset="0"/>
+              <a:buChar char="•"/>
+            </a:pPr>
+            <a:r>
+              <a:rPr lang="en-US" sz="2800" dirty="0">
+                <a:solidFill>
+                  <a:prstClr val="black"/>
+                </a:solidFill>
+              </a:rPr>
+              <a:t>Shared </a:t>
+            </a:r>
+            <a:r>
+              <a:rPr lang="en-US" sz="2800" dirty="0" smtClean="0">
+                <a:solidFill>
+                  <a:prstClr val="black"/>
+                </a:solidFill>
+              </a:rPr>
+              <a:t>Modules</a:t>
+            </a:r>
+          </a:p>
+          <a:p>
+            <a:pPr lvl="0">
+              <a:lnSpc>
+                <a:spcPct val="90000"/>
+              </a:lnSpc>
+              <a:spcBef>
+                <a:spcPts val="1000"/>
+              </a:spcBef>
+            </a:pPr>
+            <a:r>
+              <a:rPr lang="en-US" sz="2800" dirty="0" smtClean="0">
+                <a:solidFill>
+                  <a:prstClr val="black"/>
+                </a:solidFill>
+              </a:rPr>
+              <a:t> </a:t>
+            </a:r>
+            <a:endParaRPr lang="en-US" sz="2800" dirty="0">
+              <a:solidFill>
+                <a:prstClr val="black"/>
+              </a:solidFill>
+            </a:endParaRPr>
+          </a:p>
+          <a:p>
+            <a:pPr marL="228600" lvl="0" indent="-228600">
+              <a:lnSpc>
+                <a:spcPct val="90000"/>
+              </a:lnSpc>
+              <a:spcBef>
+                <a:spcPts val="1000"/>
+              </a:spcBef>
+              <a:buFont typeface="Arial" panose="020B0604020202020204" pitchFamily="34" charset="0"/>
+              <a:buChar char="•"/>
+            </a:pPr>
+            <a:r>
+              <a:rPr lang="en-US" sz="2800" dirty="0">
+                <a:solidFill>
+                  <a:prstClr val="black"/>
+                </a:solidFill>
+              </a:rPr>
+              <a:t>Service Module </a:t>
+            </a:r>
+          </a:p>
+        </p:txBody>
+      </p:sp>
+      <p:sp>
+        <p:nvSpPr>
+          <p:cNvPr id="7" name="TextBox 6"/>
+          <p:cNvSpPr txBox="1"/>
+          <p:nvPr/>
+        </p:nvSpPr>
+        <p:spPr>
+          <a:xfrm>
+            <a:off x="1004552" y="1918952"/>
+            <a:ext cx="3554569" cy="2821285"/>
+          </a:xfrm>
+          <a:prstGeom prst="rect">
+            <a:avLst/>
+          </a:prstGeom>
+          <a:noFill/>
+        </p:spPr>
+        <p:txBody>
+          <a:bodyPr wrap="square" rtlCol="0">
+            <a:spAutoFit/>
+          </a:bodyPr>
+          <a:lstStyle/>
+          <a:p>
+            <a:pPr marL="228600" lvl="0" indent="-228600">
+              <a:lnSpc>
+                <a:spcPct val="90000"/>
+              </a:lnSpc>
+              <a:spcBef>
+                <a:spcPts val="1000"/>
+              </a:spcBef>
+              <a:buFont typeface="Arial" panose="020B0604020202020204" pitchFamily="34" charset="0"/>
+              <a:buChar char="•"/>
+            </a:pPr>
+            <a:r>
+              <a:rPr lang="en-US" sz="2800" dirty="0">
+                <a:solidFill>
+                  <a:prstClr val="black"/>
+                </a:solidFill>
+              </a:rPr>
+              <a:t>Root Module</a:t>
+            </a:r>
+          </a:p>
+          <a:p>
+            <a:pPr marL="228600" lvl="0" indent="-228600">
+              <a:lnSpc>
+                <a:spcPct val="90000"/>
+              </a:lnSpc>
+              <a:spcBef>
+                <a:spcPts val="1000"/>
+              </a:spcBef>
+              <a:buFont typeface="Arial" panose="020B0604020202020204" pitchFamily="34" charset="0"/>
+              <a:buChar char="•"/>
+            </a:pPr>
+            <a:endParaRPr lang="en-US" sz="2800" dirty="0">
+              <a:solidFill>
+                <a:prstClr val="black"/>
+              </a:solidFill>
+            </a:endParaRPr>
+          </a:p>
+          <a:p>
+            <a:pPr marL="228600" lvl="0" indent="-228600">
+              <a:lnSpc>
+                <a:spcPct val="90000"/>
+              </a:lnSpc>
+              <a:spcBef>
+                <a:spcPts val="1000"/>
+              </a:spcBef>
+              <a:buFont typeface="Arial" panose="020B0604020202020204" pitchFamily="34" charset="0"/>
+              <a:buChar char="•"/>
+            </a:pPr>
+            <a:r>
+              <a:rPr lang="en-US" sz="2800" dirty="0">
+                <a:solidFill>
+                  <a:prstClr val="black"/>
+                </a:solidFill>
+              </a:rPr>
+              <a:t>Core Module</a:t>
+            </a:r>
+          </a:p>
+          <a:p>
+            <a:pPr marL="228600" lvl="0" indent="-228600">
+              <a:lnSpc>
+                <a:spcPct val="90000"/>
+              </a:lnSpc>
+              <a:spcBef>
+                <a:spcPts val="1000"/>
+              </a:spcBef>
+              <a:buFont typeface="Arial" panose="020B0604020202020204" pitchFamily="34" charset="0"/>
+              <a:buChar char="•"/>
+            </a:pPr>
+            <a:endParaRPr lang="en-US" sz="2800" dirty="0">
+              <a:solidFill>
+                <a:prstClr val="black"/>
+              </a:solidFill>
+            </a:endParaRPr>
+          </a:p>
+          <a:p>
+            <a:pPr marL="228600" lvl="0" indent="-228600">
+              <a:lnSpc>
+                <a:spcPct val="90000"/>
+              </a:lnSpc>
+              <a:spcBef>
+                <a:spcPts val="1000"/>
+              </a:spcBef>
+              <a:buFont typeface="Arial" panose="020B0604020202020204" pitchFamily="34" charset="0"/>
+              <a:buChar char="•"/>
+            </a:pPr>
+            <a:r>
+              <a:rPr lang="en-US" sz="2800" dirty="0">
+                <a:solidFill>
+                  <a:prstClr val="black"/>
+                </a:solidFill>
+              </a:rPr>
+              <a:t>Feature Modules </a:t>
+            </a:r>
+          </a:p>
+          <a:p>
+            <a:endParaRPr lang="en-US" dirty="0"/>
+          </a:p>
+        </p:txBody>
+      </p:sp>
+    </p:spTree>
+    <p:extLst>
+      <p:ext uri="{BB962C8B-B14F-4D97-AF65-F5344CB8AC3E}">
+        <p14:creationId xmlns:p14="http://schemas.microsoft.com/office/powerpoint/2010/main" val="1295612281"/>
+      </p:ext>
+    </p:extLst>
+  </p:cSld>
+  <p:clrMapOvr>
+    <a:masterClrMapping/>
+  </p:clrMapOvr>
+</p:sld>
+</file>
+
+<file path=ppt/slides/slide11.xml><?xml version="1.0" encoding="utf-8"?>
+<p:sld xmlns:a="http://schemas.openxmlformats.org/drawingml/2006/main" xmlns:r="http://schemas.openxmlformats.org/officeDocument/2006/relationships" xmlns:p="http://schemas.openxmlformats.org/presentationml/2006/main">
+  <p:cSld>
+    <p:spTree>
+      <p:nvGrpSpPr>
+        <p:cNvPr id="1" name=""/>
+        <p:cNvGrpSpPr/>
+        <p:nvPr/>
+      </p:nvGrpSpPr>
+      <p:grpSpPr>
+        <a:xfrm>
+          <a:off x="0" y="0"/>
+          <a:ext cx="0" cy="0"/>
+          <a:chOff x="0" y="0"/>
+          <a:chExt cx="0" cy="0"/>
+        </a:xfrm>
+      </p:grpSpPr>
+      <p:sp>
+        <p:nvSpPr>
+          <p:cNvPr id="2" name="Title 1"/>
+          <p:cNvSpPr>
+            <a:spLocks noGrp="1"/>
+          </p:cNvSpPr>
+          <p:nvPr>
+            <p:ph type="title"/>
+          </p:nvPr>
+        </p:nvSpPr>
+        <p:spPr/>
+        <p:txBody>
+          <a:bodyPr/>
+          <a:lstStyle/>
+          <a:p>
+            <a:endParaRPr lang="en-US"/>
+          </a:p>
+        </p:txBody>
+      </p:sp>
+      <p:sp>
+        <p:nvSpPr>
+          <p:cNvPr id="3" name="Content Placeholder 2"/>
+          <p:cNvSpPr>
+            <a:spLocks noGrp="1"/>
+          </p:cNvSpPr>
+          <p:nvPr>
+            <p:ph idx="1"/>
+          </p:nvPr>
+        </p:nvSpPr>
+        <p:spPr/>
+        <p:txBody>
+          <a:bodyPr/>
+          <a:lstStyle/>
+          <a:p>
+            <a:endParaRPr lang="en-US"/>
+          </a:p>
+        </p:txBody>
+      </p:sp>
+    </p:spTree>
+    <p:extLst>
+      <p:ext uri="{BB962C8B-B14F-4D97-AF65-F5344CB8AC3E}">
+        <p14:creationId xmlns:p14="http://schemas.microsoft.com/office/powerpoint/2010/main" val="3790653409"/>
+      </p:ext>
+    </p:extLst>
+  </p:cSld>
+  <p:clrMapOvr>
+    <a:masterClrMapping/>
+  </p:clrMapOvr>
+</p:sld>
+</file>
+
 <file path=ppt/slides/slide2.xml><?xml version="1.0" encoding="utf-8"?>
 <p:sld xmlns:a="http://schemas.openxmlformats.org/drawingml/2006/main" xmlns:r="http://schemas.openxmlformats.org/officeDocument/2006/relationships" xmlns:p="http://schemas.openxmlformats.org/presentationml/2006/main">
   <p:cSld>
@@ -3075,7 +3499,10 @@
           <a:bodyPr/>
           <a:lstStyle/>
           <a:p>
-            <a:endParaRPr lang="en-US"/>
+            <a:r>
+              <a:rPr lang="en-US" dirty="0" smtClean="0"/>
+              <a:t>Setup:</a:t>
+            </a:r>
           </a:p>
         </p:txBody>
       </p:sp>
@@ -3094,14 +3521,88 @@
           <a:bodyPr/>
           <a:lstStyle/>
           <a:p>
-            <a:endParaRPr lang="en-US"/>
+            <a:r>
+              <a:rPr lang="en-US" dirty="0" smtClean="0"/>
+              <a:t>Node Version: </a:t>
+            </a:r>
+          </a:p>
+          <a:p>
+            <a:pPr marL="457200" lvl="1" indent="0">
+              <a:buNone/>
+            </a:pPr>
+            <a:r>
+              <a:rPr lang="en-US" b="1" dirty="0" smtClean="0"/>
+              <a:t>node --version</a:t>
+            </a:r>
+          </a:p>
+          <a:p>
+            <a:pPr marL="457200" lvl="1" indent="0">
+              <a:buNone/>
+            </a:pPr>
+            <a:endParaRPr lang="en-US" dirty="0" smtClean="0"/>
+          </a:p>
+          <a:p>
+            <a:r>
+              <a:rPr lang="en-US" dirty="0" smtClean="0"/>
+              <a:t>OPTUM’s </a:t>
+            </a:r>
+            <a:r>
+              <a:rPr lang="en-US" dirty="0" err="1" smtClean="0"/>
+              <a:t>npm</a:t>
+            </a:r>
+            <a:r>
+              <a:rPr lang="en-US" dirty="0" smtClean="0"/>
+              <a:t> registry:</a:t>
+            </a:r>
+            <a:br>
+              <a:rPr lang="en-US" dirty="0" smtClean="0"/>
+            </a:br>
+            <a:r>
+              <a:rPr lang="en-US" sz="2400" b="1" dirty="0" err="1" smtClean="0"/>
+              <a:t>npm</a:t>
+            </a:r>
+            <a:r>
+              <a:rPr lang="en-US" sz="2400" b="1" dirty="0" smtClean="0"/>
+              <a:t> </a:t>
+            </a:r>
+            <a:r>
+              <a:rPr lang="en-US" sz="2400" b="1" dirty="0" err="1" smtClean="0"/>
+              <a:t>config</a:t>
+            </a:r>
+            <a:r>
+              <a:rPr lang="en-US" sz="2400" b="1" dirty="0" smtClean="0"/>
+              <a:t> set registry https://repo1.uhc.com/artifactory/api/npm/npm-virtual/ --global</a:t>
+            </a:r>
+          </a:p>
+          <a:p>
+            <a:endParaRPr lang="en-US" sz="2400" dirty="0" smtClean="0"/>
+          </a:p>
+          <a:p>
+            <a:r>
+              <a:rPr lang="en-US" dirty="0" smtClean="0"/>
+              <a:t>Angular setup:</a:t>
+            </a:r>
+          </a:p>
+          <a:p>
+            <a:pPr marL="457200" lvl="1" indent="0">
+              <a:buNone/>
+            </a:pPr>
+            <a:r>
+              <a:rPr lang="en-US" b="1" dirty="0" err="1" smtClean="0"/>
+              <a:t>npm</a:t>
+            </a:r>
+            <a:r>
+              <a:rPr lang="en-US" b="1" dirty="0" smtClean="0"/>
+              <a:t> install -g @angular/cli</a:t>
+            </a:r>
+            <a:endParaRPr lang="en-US" dirty="0"/>
           </a:p>
         </p:txBody>
       </p:sp>
     </p:spTree>
     <p:extLst>
       <p:ext uri="{BB962C8B-B14F-4D97-AF65-F5344CB8AC3E}">
-        <p14:creationId xmlns:p14="http://schemas.microsoft.com/office/powerpoint/2010/main" val="2484601901"/>
+        <p14:creationId xmlns:p14="http://schemas.microsoft.com/office/powerpoint/2010/main" val="2268644192"/>
       </p:ext>
     </p:extLst>
   </p:cSld>
@@ -3138,12 +3639,24 @@
             <p:ph type="title"/>
           </p:nvPr>
         </p:nvSpPr>
-        <p:spPr/>
-        <p:txBody>
-          <a:bodyPr/>
-          <a:lstStyle/>
-          <a:p>
-            <a:endParaRPr lang="en-US"/>
+        <p:spPr>
+          <a:xfrm>
+            <a:off x="824248" y="373487"/>
+            <a:ext cx="10529552" cy="1452138"/>
+          </a:xfrm>
+        </p:spPr>
+        <p:txBody>
+          <a:bodyPr/>
+          <a:lstStyle/>
+          <a:p>
+            <a:r>
+              <a:rPr lang="en-US" dirty="0" smtClean="0"/>
+              <a:t>Create a workspace and initial application</a:t>
+            </a:r>
+            <a:br>
+              <a:rPr lang="en-US" dirty="0" smtClean="0"/>
+            </a:br>
+            <a:endParaRPr lang="en-US" dirty="0"/>
           </a:p>
         </p:txBody>
       </p:sp>
@@ -3162,14 +3675,102 @@
           <a:bodyPr/>
           <a:lstStyle/>
           <a:p>
-            <a:endParaRPr lang="en-US"/>
+            <a:pPr marL="0" indent="0">
+              <a:buNone/>
+            </a:pPr>
+            <a:endParaRPr lang="en-US" dirty="0" smtClean="0"/>
+          </a:p>
+          <a:p>
+            <a:pPr marL="0" indent="0">
+              <a:buNone/>
+            </a:pPr>
+            <a:r>
+              <a:rPr lang="en-US" dirty="0" err="1" smtClean="0"/>
+              <a:t>Cmd</a:t>
+            </a:r>
+            <a:r>
+              <a:rPr lang="en-US" dirty="0" smtClean="0"/>
+              <a:t>: ng new my-app</a:t>
+            </a:r>
+          </a:p>
+          <a:p>
+            <a:pPr marL="0" indent="0">
+              <a:buNone/>
+            </a:pPr>
+            <a:endParaRPr lang="en-US" dirty="0" smtClean="0"/>
+          </a:p>
+          <a:p>
+            <a:r>
+              <a:rPr lang="en-US" dirty="0"/>
+              <a:t>No for strict type </a:t>
+            </a:r>
+            <a:r>
+              <a:rPr lang="en-US" dirty="0" smtClean="0"/>
+              <a:t>checking.</a:t>
+            </a:r>
+          </a:p>
+          <a:p>
+            <a:r>
+              <a:rPr lang="en-US" dirty="0" smtClean="0"/>
+              <a:t>Select Yes(Y) </a:t>
+            </a:r>
+            <a:r>
+              <a:rPr lang="en-US" dirty="0"/>
+              <a:t>for </a:t>
+            </a:r>
+            <a:r>
+              <a:rPr lang="en-US" dirty="0" smtClean="0"/>
+              <a:t>Routing.</a:t>
+            </a:r>
+          </a:p>
+          <a:p>
+            <a:r>
+              <a:rPr lang="en-US" dirty="0" smtClean="0"/>
+              <a:t>Select </a:t>
+            </a:r>
+            <a:r>
+              <a:rPr lang="en-US" dirty="0"/>
+              <a:t>SCSS for </a:t>
+            </a:r>
+            <a:r>
+              <a:rPr lang="en-US" dirty="0" smtClean="0"/>
+              <a:t>Styling.</a:t>
+            </a:r>
+            <a:endParaRPr lang="en-US" dirty="0"/>
+          </a:p>
+          <a:p>
+            <a:r>
+              <a:rPr lang="en-US" dirty="0"/>
+              <a:t>Download VS </a:t>
+            </a:r>
+            <a:r>
+              <a:rPr lang="en-US" dirty="0" smtClean="0"/>
+              <a:t>code Editor.</a:t>
+            </a:r>
+            <a:br>
+              <a:rPr lang="en-US" dirty="0" smtClean="0"/>
+            </a:br>
+            <a:r>
+              <a:rPr lang="en-US" dirty="0" smtClean="0"/>
+              <a:t>Link</a:t>
+            </a:r>
+            <a:r>
+              <a:rPr lang="en-US" dirty="0"/>
+              <a:t>: https://code.visualstudio.com/download</a:t>
+            </a:r>
+          </a:p>
+          <a:p>
+            <a:pPr marL="0" indent="0">
+              <a:buNone/>
+            </a:pPr>
+            <a:endParaRPr lang="en-US" dirty="0"/>
           </a:p>
         </p:txBody>
       </p:sp>
     </p:spTree>
     <p:extLst>
       <p:ext uri="{BB962C8B-B14F-4D97-AF65-F5344CB8AC3E}">
-        <p14:creationId xmlns:p14="http://schemas.microsoft.com/office/powerpoint/2010/main" val="4115962096"/>
+        <p14:creationId xmlns:p14="http://schemas.microsoft.com/office/powerpoint/2010/main" val="1173425677"/>
       </p:ext>
     </p:extLst>
   </p:cSld>
@@ -3196,48 +3797,136 @@
           <a:chExt cx="0" cy="0"/>
         </a:xfrm>
       </p:grpSpPr>
-      <p:sp>
-        <p:nvSpPr>
-          <p:cNvPr id="2" name="Title 1"/>
-          <p:cNvSpPr>
-            <a:spLocks noGrp="1"/>
-          </p:cNvSpPr>
-          <p:nvPr>
-            <p:ph type="title"/>
-          </p:nvPr>
-        </p:nvSpPr>
-        <p:spPr/>
-        <p:txBody>
-          <a:bodyPr/>
-          <a:lstStyle/>
-          <a:p>
-            <a:endParaRPr lang="en-US"/>
-          </a:p>
-        </p:txBody>
-      </p:sp>
-      <p:sp>
-        <p:nvSpPr>
-          <p:cNvPr id="3" name="Content Placeholder 2"/>
-          <p:cNvSpPr>
-            <a:spLocks noGrp="1"/>
-          </p:cNvSpPr>
-          <p:nvPr>
-            <p:ph idx="1"/>
-          </p:nvPr>
-        </p:nvSpPr>
-        <p:spPr/>
-        <p:txBody>
-          <a:bodyPr/>
-          <a:lstStyle/>
-          <a:p>
-            <a:endParaRPr lang="en-US"/>
+      <p:pic>
+        <p:nvPicPr>
+          <p:cNvPr id="7" name="Picture 6"/>
+          <p:cNvPicPr>
+            <a:picLocks noChangeAspect="1"/>
+          </p:cNvPicPr>
+          <p:nvPr/>
+        </p:nvPicPr>
+        <p:blipFill>
+          <a:blip r:embed="rId2"/>
+          <a:stretch>
+            <a:fillRect/>
+          </a:stretch>
+        </p:blipFill>
+        <p:spPr>
+          <a:xfrm>
+            <a:off x="336661" y="1277691"/>
+            <a:ext cx="11458575" cy="5410200"/>
+          </a:xfrm>
+          <a:prstGeom prst="rect">
+            <a:avLst/>
+          </a:prstGeom>
+        </p:spPr>
+      </p:pic>
+      <p:cxnSp>
+        <p:nvCxnSpPr>
+          <p:cNvPr id="9" name="Straight Arrow Connector 8"/>
+          <p:cNvCxnSpPr/>
+          <p:nvPr/>
+        </p:nvCxnSpPr>
+        <p:spPr>
+          <a:xfrm flipV="1">
+            <a:off x="4816697" y="3026535"/>
+            <a:ext cx="2498501" cy="1"/>
+          </a:xfrm>
+          <a:prstGeom prst="straightConnector1">
+            <a:avLst/>
+          </a:prstGeom>
+          <a:ln>
+            <a:solidFill>
+              <a:schemeClr val="tx1"/>
+            </a:solidFill>
+            <a:tailEnd type="triangle"/>
+          </a:ln>
+        </p:spPr>
+        <p:style>
+          <a:lnRef idx="1">
+            <a:schemeClr val="accent1"/>
+          </a:lnRef>
+          <a:fillRef idx="0">
+            <a:schemeClr val="accent1"/>
+          </a:fillRef>
+          <a:effectRef idx="0">
+            <a:schemeClr val="accent1"/>
+          </a:effectRef>
+          <a:fontRef idx="minor">
+            <a:schemeClr val="tx1"/>
+          </a:fontRef>
+        </p:style>
+      </p:cxnSp>
+      <p:cxnSp>
+        <p:nvCxnSpPr>
+          <p:cNvPr id="12" name="Straight Arrow Connector 11"/>
+          <p:cNvCxnSpPr/>
+          <p:nvPr/>
+        </p:nvCxnSpPr>
+        <p:spPr>
+          <a:xfrm flipH="1">
+            <a:off x="4836017" y="3631842"/>
+            <a:ext cx="2498500" cy="1"/>
+          </a:xfrm>
+          <a:prstGeom prst="straightConnector1">
+            <a:avLst/>
+          </a:prstGeom>
+          <a:ln>
+            <a:solidFill>
+              <a:schemeClr val="tx1"/>
+            </a:solidFill>
+            <a:tailEnd type="triangle"/>
+          </a:ln>
+        </p:spPr>
+        <p:style>
+          <a:lnRef idx="1">
+            <a:schemeClr val="accent1"/>
+          </a:lnRef>
+          <a:fillRef idx="0">
+            <a:schemeClr val="accent1"/>
+          </a:fillRef>
+          <a:effectRef idx="0">
+            <a:schemeClr val="accent1"/>
+          </a:effectRef>
+          <a:fontRef idx="minor">
+            <a:schemeClr val="tx1"/>
+          </a:fontRef>
+        </p:style>
+      </p:cxnSp>
+      <p:sp>
+        <p:nvSpPr>
+          <p:cNvPr id="14" name="TextBox 13"/>
+          <p:cNvSpPr txBox="1"/>
+          <p:nvPr/>
+        </p:nvSpPr>
+        <p:spPr>
+          <a:xfrm>
+            <a:off x="528034" y="412124"/>
+            <a:ext cx="11114467" cy="523220"/>
+          </a:xfrm>
+          <a:prstGeom prst="rect">
+            <a:avLst/>
+          </a:prstGeom>
+          <a:noFill/>
+        </p:spPr>
+        <p:txBody>
+          <a:bodyPr wrap="square" rtlCol="0">
+            <a:spAutoFit/>
+          </a:bodyPr>
+          <a:lstStyle/>
+          <a:p>
+            <a:r>
+              <a:rPr lang="en-US" sz="2800" dirty="0"/>
+              <a:t>Angular Basics</a:t>
+            </a:r>
+            <a:endParaRPr lang="en-US" sz="2800" dirty="0"/>
           </a:p>
         </p:txBody>
       </p:sp>
     </p:spTree>
     <p:extLst>
       <p:ext uri="{BB962C8B-B14F-4D97-AF65-F5344CB8AC3E}">
-        <p14:creationId xmlns:p14="http://schemas.microsoft.com/office/powerpoint/2010/main" val="803843864"/>
+        <p14:creationId xmlns:p14="http://schemas.microsoft.com/office/powerpoint/2010/main" val="454186241"/>
       </p:ext>
     </p:extLst>
   </p:cSld>
@@ -3279,13 +3968,17 @@
           <a:bodyPr/>
           <a:lstStyle/>
           <a:p>
-            <a:endParaRPr lang="en-US"/>
-          </a:p>
-        </p:txBody>
-      </p:sp>
-      <p:sp>
-        <p:nvSpPr>
-          <p:cNvPr id="3" name="Content Placeholder 2"/>
+            <a:r>
+              <a:rPr lang="en-US" dirty="0"/>
+              <a:t>Angular Basics</a:t>
+            </a:r>
+            <a:endParaRPr lang="en-US" dirty="0"/>
+          </a:p>
+        </p:txBody>
+      </p:sp>
+      <p:sp>
+        <p:nvSpPr>
+          <p:cNvPr id="7" name="Content Placeholder 6"/>
           <p:cNvSpPr>
             <a:spLocks noGrp="1"/>
           </p:cNvSpPr>
@@ -3298,14 +3991,52 @@
           <a:bodyPr/>
           <a:lstStyle/>
           <a:p>
-            <a:endParaRPr lang="en-US"/>
-          </a:p>
-        </p:txBody>
-      </p:sp>
+            <a:r>
+              <a:rPr lang="en-US" dirty="0"/>
+              <a:t>Applications that are contained within one web page are called single-page applications (SPA</a:t>
+            </a:r>
+            <a:r>
+              <a:rPr lang="en-US" dirty="0" smtClean="0"/>
+              <a:t>).</a:t>
+            </a:r>
+          </a:p>
+          <a:p>
+            <a:r>
+              <a:rPr lang="en-US" dirty="0" smtClean="0"/>
+              <a:t>All the views are displayed in one page i.e., “index.html”.</a:t>
+            </a:r>
+            <a:endParaRPr lang="en-US" dirty="0"/>
+          </a:p>
+        </p:txBody>
+      </p:sp>
+      <p:pic>
+        <p:nvPicPr>
+          <p:cNvPr id="8" name="Content Placeholder 3"/>
+          <p:cNvPicPr>
+            <a:picLocks noChangeAspect="1"/>
+          </p:cNvPicPr>
+          <p:nvPr/>
+        </p:nvPicPr>
+        <p:blipFill>
+          <a:blip r:embed="rId2"/>
+          <a:stretch>
+            <a:fillRect/>
+          </a:stretch>
+        </p:blipFill>
+        <p:spPr>
+          <a:xfrm>
+            <a:off x="3086100" y="3556368"/>
+            <a:ext cx="6019800" cy="2400300"/>
+          </a:xfrm>
+          <a:prstGeom prst="rect">
+            <a:avLst/>
+          </a:prstGeom>
+        </p:spPr>
+      </p:pic>
     </p:spTree>
     <p:extLst>
       <p:ext uri="{BB962C8B-B14F-4D97-AF65-F5344CB8AC3E}">
-        <p14:creationId xmlns:p14="http://schemas.microsoft.com/office/powerpoint/2010/main" val="1295612281"/>
+        <p14:creationId xmlns:p14="http://schemas.microsoft.com/office/powerpoint/2010/main" val="3212534862"/>
       </p:ext>
     </p:extLst>
   </p:cSld>
@@ -3347,33 +4078,753 @@
           <a:bodyPr/>
           <a:lstStyle/>
           <a:p>
-            <a:endParaRPr lang="en-US"/>
-          </a:p>
-        </p:txBody>
-      </p:sp>
-      <p:sp>
-        <p:nvSpPr>
-          <p:cNvPr id="3" name="Content Placeholder 2"/>
-          <p:cNvSpPr>
-            <a:spLocks noGrp="1"/>
-          </p:cNvSpPr>
+            <a:r>
+              <a:rPr lang="en-US" dirty="0" smtClean="0"/>
+              <a:t>Angular Architecture</a:t>
+            </a:r>
+            <a:endParaRPr lang="en-US" dirty="0"/>
+          </a:p>
+        </p:txBody>
+      </p:sp>
+      <p:pic>
+        <p:nvPicPr>
+          <p:cNvPr id="4" name="Content Placeholder 3"/>
+          <p:cNvPicPr>
+            <a:picLocks noGrp="1" noChangeAspect="1"/>
+          </p:cNvPicPr>
           <p:nvPr>
             <p:ph idx="1"/>
           </p:nvPr>
-        </p:nvSpPr>
-        <p:spPr/>
-        <p:txBody>
-          <a:bodyPr/>
-          <a:lstStyle/>
-          <a:p>
-            <a:endParaRPr lang="en-US"/>
+        </p:nvPicPr>
+        <p:blipFill>
+          <a:blip r:embed="rId2"/>
+          <a:stretch>
+            <a:fillRect/>
+          </a:stretch>
+        </p:blipFill>
+        <p:spPr>
+          <a:xfrm>
+            <a:off x="1236373" y="1690688"/>
+            <a:ext cx="9156878" cy="4529808"/>
+          </a:xfrm>
+          <a:prstGeom prst="rect">
+            <a:avLst/>
+          </a:prstGeom>
+        </p:spPr>
+      </p:pic>
+      <p:sp>
+        <p:nvSpPr>
+          <p:cNvPr id="7" name="TextBox 6"/>
+          <p:cNvSpPr txBox="1"/>
+          <p:nvPr/>
+        </p:nvSpPr>
+        <p:spPr>
+          <a:xfrm>
+            <a:off x="838200" y="1632528"/>
+            <a:ext cx="9736428" cy="5087155"/>
+          </a:xfrm>
+          <a:prstGeom prst="rect">
+            <a:avLst/>
+          </a:prstGeom>
+          <a:noFill/>
+          <a:ln>
+            <a:solidFill>
+              <a:schemeClr val="tx1"/>
+            </a:solidFill>
+          </a:ln>
+        </p:spPr>
+        <p:txBody>
+          <a:bodyPr wrap="square" rtlCol="0">
+            <a:spAutoFit/>
+          </a:bodyPr>
+          <a:lstStyle/>
+          <a:p>
+            <a:endParaRPr lang="en-US" dirty="0"/>
+          </a:p>
+        </p:txBody>
+      </p:sp>
+      <p:sp>
+        <p:nvSpPr>
+          <p:cNvPr id="8" name="TextBox 7"/>
+          <p:cNvSpPr txBox="1"/>
+          <p:nvPr/>
+        </p:nvSpPr>
+        <p:spPr>
+          <a:xfrm>
+            <a:off x="5338293" y="6220496"/>
+            <a:ext cx="1706451" cy="369332"/>
+          </a:xfrm>
+          <a:prstGeom prst="rect">
+            <a:avLst/>
+          </a:prstGeom>
+          <a:noFill/>
+          <a:ln>
+            <a:solidFill>
+              <a:schemeClr val="tx1"/>
+            </a:solidFill>
+          </a:ln>
+        </p:spPr>
+        <p:txBody>
+          <a:bodyPr wrap="square" rtlCol="0">
+            <a:spAutoFit/>
+          </a:bodyPr>
+          <a:lstStyle/>
+          <a:p>
+            <a:r>
+              <a:rPr lang="en-US" dirty="0" smtClean="0"/>
+              <a:t>Root Module</a:t>
+            </a:r>
+            <a:endParaRPr lang="en-US" dirty="0"/>
+          </a:p>
+        </p:txBody>
+      </p:sp>
+      <p:sp>
+        <p:nvSpPr>
+          <p:cNvPr id="11" name="TextBox 10"/>
+          <p:cNvSpPr txBox="1"/>
+          <p:nvPr/>
+        </p:nvSpPr>
+        <p:spPr>
+          <a:xfrm>
+            <a:off x="5631287" y="5582786"/>
+            <a:ext cx="1120462" cy="369332"/>
+          </a:xfrm>
+          <a:prstGeom prst="rect">
+            <a:avLst/>
+          </a:prstGeom>
+          <a:noFill/>
+        </p:spPr>
+        <p:txBody>
+          <a:bodyPr wrap="square" rtlCol="0">
+            <a:spAutoFit/>
+          </a:bodyPr>
+          <a:lstStyle/>
+          <a:p>
+            <a:r>
+              <a:rPr lang="en-US" dirty="0" smtClean="0"/>
+              <a:t>Module</a:t>
+            </a:r>
+            <a:endParaRPr lang="en-US" dirty="0"/>
+          </a:p>
+        </p:txBody>
+      </p:sp>
+      <p:sp>
+        <p:nvSpPr>
+          <p:cNvPr id="12" name="TextBox 11"/>
+          <p:cNvSpPr txBox="1"/>
+          <p:nvPr/>
+        </p:nvSpPr>
+        <p:spPr>
+          <a:xfrm>
+            <a:off x="4262907" y="1970468"/>
+            <a:ext cx="3696237" cy="3981650"/>
+          </a:xfrm>
+          <a:prstGeom prst="rect">
+            <a:avLst/>
+          </a:prstGeom>
+          <a:noFill/>
+          <a:ln>
+            <a:solidFill>
+              <a:schemeClr val="tx1"/>
+            </a:solidFill>
+          </a:ln>
+        </p:spPr>
+        <p:txBody>
+          <a:bodyPr wrap="square" rtlCol="0">
+            <a:spAutoFit/>
+          </a:bodyPr>
+          <a:lstStyle/>
+          <a:p>
+            <a:endParaRPr lang="en-US" dirty="0"/>
           </a:p>
         </p:txBody>
       </p:sp>
     </p:spTree>
     <p:extLst>
       <p:ext uri="{BB962C8B-B14F-4D97-AF65-F5344CB8AC3E}">
-        <p14:creationId xmlns:p14="http://schemas.microsoft.com/office/powerpoint/2010/main" val="3790653409"/>
+        <p14:creationId xmlns:p14="http://schemas.microsoft.com/office/powerpoint/2010/main" val="2789875317"/>
+      </p:ext>
+    </p:extLst>
+  </p:cSld>
+  <p:clrMapOvr>
+    <a:masterClrMapping/>
+  </p:clrMapOvr>
+</p:sld>
+</file>
+
+<file path=ppt/slides/slide7.xml><?xml version="1.0" encoding="utf-8"?>
+<p:sld xmlns:a="http://schemas.openxmlformats.org/drawingml/2006/main" xmlns:r="http://schemas.openxmlformats.org/officeDocument/2006/relationships" xmlns:p="http://schemas.openxmlformats.org/presentationml/2006/main">
+  <p:cSld>
+    <p:spTree>
+      <p:nvGrpSpPr>
+        <p:cNvPr id="1" name=""/>
+        <p:cNvGrpSpPr/>
+        <p:nvPr/>
+      </p:nvGrpSpPr>
+      <p:grpSpPr>
+        <a:xfrm>
+          <a:off x="0" y="0"/>
+          <a:ext cx="0" cy="0"/>
+          <a:chOff x="0" y="0"/>
+          <a:chExt cx="0" cy="0"/>
+        </a:xfrm>
+      </p:grpSpPr>
+      <p:sp>
+        <p:nvSpPr>
+          <p:cNvPr id="2" name="Title 1"/>
+          <p:cNvSpPr>
+            <a:spLocks noGrp="1"/>
+          </p:cNvSpPr>
+          <p:nvPr>
+            <p:ph type="title"/>
+          </p:nvPr>
+        </p:nvSpPr>
+        <p:spPr/>
+        <p:txBody>
+          <a:bodyPr/>
+          <a:lstStyle/>
+          <a:p>
+            <a:r>
+              <a:rPr lang="en-US" dirty="0" smtClean="0"/>
+              <a:t>Dependency Injection</a:t>
+            </a:r>
+            <a:endParaRPr lang="en-US" dirty="0"/>
+          </a:p>
+        </p:txBody>
+      </p:sp>
+      <p:pic>
+        <p:nvPicPr>
+          <p:cNvPr id="4" name="Content Placeholder 3"/>
+          <p:cNvPicPr>
+            <a:picLocks noGrp="1" noChangeAspect="1"/>
+          </p:cNvPicPr>
+          <p:nvPr>
+            <p:ph idx="1"/>
+          </p:nvPr>
+        </p:nvPicPr>
+        <p:blipFill>
+          <a:blip r:embed="rId2"/>
+          <a:stretch>
+            <a:fillRect/>
+          </a:stretch>
+        </p:blipFill>
+        <p:spPr>
+          <a:xfrm>
+            <a:off x="2033863" y="2125014"/>
+            <a:ext cx="7368928" cy="3451538"/>
+          </a:xfrm>
+          <a:prstGeom prst="rect">
+            <a:avLst/>
+          </a:prstGeom>
+        </p:spPr>
+      </p:pic>
+    </p:spTree>
+    <p:extLst>
+      <p:ext uri="{BB962C8B-B14F-4D97-AF65-F5344CB8AC3E}">
+        <p14:creationId xmlns:p14="http://schemas.microsoft.com/office/powerpoint/2010/main" val="3035570398"/>
+      </p:ext>
+    </p:extLst>
+  </p:cSld>
+  <p:clrMapOvr>
+    <a:masterClrMapping/>
+  </p:clrMapOvr>
+</p:sld>
+</file>
+
+<file path=ppt/slides/slide8.xml><?xml version="1.0" encoding="utf-8"?>
+<p:sld xmlns:a="http://schemas.openxmlformats.org/drawingml/2006/main" xmlns:r="http://schemas.openxmlformats.org/officeDocument/2006/relationships" xmlns:p="http://schemas.openxmlformats.org/presentationml/2006/main">
+  <p:cSld>
+    <p:spTree>
+      <p:nvGrpSpPr>
+        <p:cNvPr id="1" name=""/>
+        <p:cNvGrpSpPr/>
+        <p:nvPr/>
+      </p:nvGrpSpPr>
+      <p:grpSpPr>
+        <a:xfrm>
+          <a:off x="0" y="0"/>
+          <a:ext cx="0" cy="0"/>
+          <a:chOff x="0" y="0"/>
+          <a:chExt cx="0" cy="0"/>
+        </a:xfrm>
+      </p:grpSpPr>
+      <p:sp>
+        <p:nvSpPr>
+          <p:cNvPr id="2" name="Title 1"/>
+          <p:cNvSpPr>
+            <a:spLocks noGrp="1"/>
+          </p:cNvSpPr>
+          <p:nvPr>
+            <p:ph type="title"/>
+          </p:nvPr>
+        </p:nvSpPr>
+        <p:spPr/>
+        <p:txBody>
+          <a:bodyPr/>
+          <a:lstStyle/>
+          <a:p>
+            <a:r>
+              <a:rPr lang="en-US" dirty="0" smtClean="0"/>
+              <a:t>Provider Scope</a:t>
+            </a:r>
+            <a:endParaRPr lang="en-US" dirty="0"/>
+          </a:p>
+        </p:txBody>
+      </p:sp>
+      <p:sp>
+        <p:nvSpPr>
+          <p:cNvPr id="3" name="Content Placeholder 2"/>
+          <p:cNvSpPr>
+            <a:spLocks noGrp="1"/>
+          </p:cNvSpPr>
+          <p:nvPr>
+            <p:ph idx="1"/>
+          </p:nvPr>
+        </p:nvSpPr>
+        <p:spPr/>
+        <p:txBody>
+          <a:bodyPr/>
+          <a:lstStyle/>
+          <a:p>
+            <a:r>
+              <a:rPr lang="en-US" dirty="0" smtClean="0"/>
+              <a:t>Root Module Level (Application Level).</a:t>
+            </a:r>
+          </a:p>
+          <a:p>
+            <a:r>
+              <a:rPr lang="en-US" dirty="0" smtClean="0"/>
+              <a:t>Module Level.</a:t>
+            </a:r>
+          </a:p>
+          <a:p>
+            <a:r>
+              <a:rPr lang="en-US" dirty="0" smtClean="0"/>
+              <a:t>Componen</a:t>
+            </a:r>
+            <a:r>
+              <a:rPr lang="en-US" dirty="0" smtClean="0"/>
+              <a:t>t Level.</a:t>
+            </a:r>
+          </a:p>
+          <a:p>
+            <a:r>
+              <a:rPr lang="en-US" dirty="0"/>
+              <a:t>Root Module (Application Level</a:t>
+            </a:r>
+            <a:r>
+              <a:rPr lang="en-US" dirty="0" smtClean="0"/>
+              <a:t>)</a:t>
+            </a:r>
+            <a:r>
+              <a:rPr lang="en-US" dirty="0" smtClean="0"/>
+              <a:t> &amp; Lazy Loaded Module </a:t>
+            </a:r>
+            <a:r>
+              <a:rPr lang="en-US" dirty="0"/>
+              <a:t>Level (Lazy Loaded </a:t>
+            </a:r>
+            <a:r>
+              <a:rPr lang="en-US" dirty="0" smtClean="0"/>
+              <a:t>Module’s unique instance).</a:t>
+            </a:r>
+            <a:endParaRPr lang="en-US" dirty="0" smtClean="0"/>
+          </a:p>
+          <a:p>
+            <a:endParaRPr lang="en-US" dirty="0" smtClean="0"/>
+          </a:p>
+          <a:p>
+            <a:endParaRPr lang="en-US" dirty="0"/>
+          </a:p>
+        </p:txBody>
+      </p:sp>
+      <p:pic>
+        <p:nvPicPr>
+          <p:cNvPr id="4" name="Picture 3"/>
+          <p:cNvPicPr>
+            <a:picLocks noChangeAspect="1"/>
+          </p:cNvPicPr>
+          <p:nvPr/>
+        </p:nvPicPr>
+        <p:blipFill>
+          <a:blip r:embed="rId2"/>
+          <a:stretch>
+            <a:fillRect/>
+          </a:stretch>
+        </p:blipFill>
+        <p:spPr>
+          <a:xfrm>
+            <a:off x="2481127" y="4344194"/>
+            <a:ext cx="5838825" cy="1266825"/>
+          </a:xfrm>
+          <a:prstGeom prst="rect">
+            <a:avLst/>
+          </a:prstGeom>
+        </p:spPr>
+      </p:pic>
+      <p:pic>
+        <p:nvPicPr>
+          <p:cNvPr id="5" name="Picture 4"/>
+          <p:cNvPicPr>
+            <a:picLocks noChangeAspect="1"/>
+          </p:cNvPicPr>
+          <p:nvPr/>
+        </p:nvPicPr>
+        <p:blipFill>
+          <a:blip r:embed="rId3"/>
+          <a:stretch>
+            <a:fillRect/>
+          </a:stretch>
+        </p:blipFill>
+        <p:spPr>
+          <a:xfrm>
+            <a:off x="2528752" y="5483225"/>
+            <a:ext cx="5791200" cy="828675"/>
+          </a:xfrm>
+          <a:prstGeom prst="rect">
+            <a:avLst/>
+          </a:prstGeom>
+        </p:spPr>
+      </p:pic>
+    </p:spTree>
+    <p:extLst>
+      <p:ext uri="{BB962C8B-B14F-4D97-AF65-F5344CB8AC3E}">
+        <p14:creationId xmlns:p14="http://schemas.microsoft.com/office/powerpoint/2010/main" val="4115962096"/>
+      </p:ext>
+    </p:extLst>
+  </p:cSld>
+  <p:clrMapOvr>
+    <a:masterClrMapping/>
+  </p:clrMapOvr>
+</p:sld>
+</file>
+
+<file path=ppt/slides/slide9.xml><?xml version="1.0" encoding="utf-8"?>
+<p:sld xmlns:a="http://schemas.openxmlformats.org/drawingml/2006/main" xmlns:r="http://schemas.openxmlformats.org/officeDocument/2006/relationships" xmlns:p="http://schemas.openxmlformats.org/presentationml/2006/main">
+  <p:cSld>
+    <p:spTree>
+      <p:nvGrpSpPr>
+        <p:cNvPr id="1" name=""/>
+        <p:cNvGrpSpPr/>
+        <p:nvPr/>
+      </p:nvGrpSpPr>
+      <p:grpSpPr>
+        <a:xfrm>
+          <a:off x="0" y="0"/>
+          <a:ext cx="0" cy="0"/>
+          <a:chOff x="0" y="0"/>
+          <a:chExt cx="0" cy="0"/>
+        </a:xfrm>
+      </p:grpSpPr>
+      <p:sp>
+        <p:nvSpPr>
+          <p:cNvPr id="2" name="Title 1"/>
+          <p:cNvSpPr>
+            <a:spLocks noGrp="1"/>
+          </p:cNvSpPr>
+          <p:nvPr>
+            <p:ph type="title"/>
+          </p:nvPr>
+        </p:nvSpPr>
+        <p:spPr/>
+        <p:txBody>
+          <a:bodyPr/>
+          <a:lstStyle/>
+          <a:p>
+            <a:r>
+              <a:rPr lang="en-US" dirty="0" smtClean="0"/>
+              <a:t>Angular Modularity</a:t>
+            </a:r>
+            <a:endParaRPr lang="en-US" dirty="0"/>
+          </a:p>
+        </p:txBody>
+      </p:sp>
+      <p:sp>
+        <p:nvSpPr>
+          <p:cNvPr id="3" name="Content Placeholder 2"/>
+          <p:cNvSpPr>
+            <a:spLocks noGrp="1"/>
+          </p:cNvSpPr>
+          <p:nvPr>
+            <p:ph idx="1"/>
+          </p:nvPr>
+        </p:nvSpPr>
+        <p:spPr/>
+        <p:txBody>
+          <a:bodyPr/>
+          <a:lstStyle/>
+          <a:p>
+            <a:r>
+              <a:rPr lang="en-US" dirty="0"/>
+              <a:t>Modules are a great way to organize an application and extend it with capabilities from external libraries</a:t>
+            </a:r>
+            <a:r>
+              <a:rPr lang="en-US" dirty="0" smtClean="0"/>
+              <a:t>.</a:t>
+            </a:r>
+            <a:br>
+              <a:rPr lang="en-US" dirty="0" smtClean="0"/>
+            </a:br>
+            <a:endParaRPr lang="en-US" dirty="0"/>
+          </a:p>
+          <a:p>
+            <a:r>
+              <a:rPr lang="en-US" dirty="0"/>
+              <a:t>The Angular framework </a:t>
+            </a:r>
+            <a:r>
+              <a:rPr lang="en-US" dirty="0" smtClean="0"/>
+              <a:t>itself is a </a:t>
+            </a:r>
+            <a:r>
+              <a:rPr lang="en-US" dirty="0"/>
+              <a:t>set of JavaScript modules</a:t>
+            </a:r>
+            <a:r>
+              <a:rPr lang="en-US" dirty="0" smtClean="0"/>
+              <a:t>.</a:t>
+            </a:r>
+            <a:br>
+              <a:rPr lang="en-US" dirty="0" smtClean="0"/>
+            </a:br>
+            <a:endParaRPr lang="en-US" dirty="0"/>
+          </a:p>
+          <a:p>
+            <a:r>
+              <a:rPr lang="en-US" dirty="0"/>
+              <a:t>F</a:t>
+            </a:r>
+            <a:r>
+              <a:rPr lang="en-US" dirty="0" smtClean="0"/>
+              <a:t>requently </a:t>
+            </a:r>
+            <a:r>
+              <a:rPr lang="en-US" dirty="0"/>
+              <a:t>used Angular modules </a:t>
+            </a:r>
+            <a:r>
+              <a:rPr lang="en-US" dirty="0" smtClean="0"/>
+              <a:t>:</a:t>
+            </a:r>
+          </a:p>
+          <a:p>
+            <a:endParaRPr lang="en-US" dirty="0" smtClean="0"/>
+          </a:p>
+          <a:p>
+            <a:pPr lvl="1"/>
+            <a:endParaRPr lang="en-US" dirty="0" smtClean="0"/>
+          </a:p>
+        </p:txBody>
+      </p:sp>
+      <p:sp>
+        <p:nvSpPr>
+          <p:cNvPr id="6" name="TextBox 5"/>
+          <p:cNvSpPr txBox="1"/>
+          <p:nvPr/>
+        </p:nvSpPr>
+        <p:spPr>
+          <a:xfrm>
+            <a:off x="5631824" y="4703917"/>
+            <a:ext cx="3979571" cy="1494768"/>
+          </a:xfrm>
+          <a:prstGeom prst="rect">
+            <a:avLst/>
+          </a:prstGeom>
+          <a:noFill/>
+        </p:spPr>
+        <p:txBody>
+          <a:bodyPr wrap="square" rtlCol="0">
+            <a:spAutoFit/>
+          </a:bodyPr>
+          <a:lstStyle/>
+          <a:p>
+            <a:pPr marL="685800" lvl="1" indent="-228600">
+              <a:lnSpc>
+                <a:spcPct val="90000"/>
+              </a:lnSpc>
+              <a:spcBef>
+                <a:spcPts val="500"/>
+              </a:spcBef>
+              <a:buFont typeface="Arial" panose="020B0604020202020204" pitchFamily="34" charset="0"/>
+              <a:buChar char="•"/>
+            </a:pPr>
+            <a:r>
+              <a:rPr lang="en-US" sz="2400" dirty="0" err="1">
+                <a:solidFill>
+                  <a:prstClr val="black"/>
+                </a:solidFill>
+              </a:rPr>
+              <a:t>ReactiveFormsModule</a:t>
+            </a:r>
+            <a:endParaRPr lang="en-US" sz="2400" dirty="0">
+              <a:solidFill>
+                <a:prstClr val="black"/>
+              </a:solidFill>
+            </a:endParaRPr>
+          </a:p>
+          <a:p>
+            <a:pPr marL="685800" lvl="1" indent="-228600">
+              <a:lnSpc>
+                <a:spcPct val="90000"/>
+              </a:lnSpc>
+              <a:spcBef>
+                <a:spcPts val="500"/>
+              </a:spcBef>
+              <a:buFont typeface="Arial" panose="020B0604020202020204" pitchFamily="34" charset="0"/>
+              <a:buChar char="•"/>
+            </a:pPr>
+            <a:r>
+              <a:rPr lang="en-US" sz="2400" dirty="0" err="1">
+                <a:solidFill>
+                  <a:prstClr val="black"/>
+                </a:solidFill>
+              </a:rPr>
+              <a:t>RouterModule</a:t>
+            </a:r>
+            <a:endParaRPr lang="en-US" sz="2400" dirty="0">
+              <a:solidFill>
+                <a:prstClr val="black"/>
+              </a:solidFill>
+            </a:endParaRPr>
+          </a:p>
+          <a:p>
+            <a:pPr marL="685800" lvl="1" indent="-228600">
+              <a:lnSpc>
+                <a:spcPct val="90000"/>
+              </a:lnSpc>
+              <a:spcBef>
+                <a:spcPts val="500"/>
+              </a:spcBef>
+              <a:buFont typeface="Arial" panose="020B0604020202020204" pitchFamily="34" charset="0"/>
+              <a:buChar char="•"/>
+            </a:pPr>
+            <a:r>
+              <a:rPr lang="en-US" sz="2400" dirty="0" err="1">
+                <a:solidFill>
+                  <a:prstClr val="black"/>
+                </a:solidFill>
+              </a:rPr>
+              <a:t>HttpClientModule</a:t>
+            </a:r>
+            <a:endParaRPr lang="en-US" sz="2400" dirty="0">
+              <a:solidFill>
+                <a:prstClr val="black"/>
+              </a:solidFill>
+            </a:endParaRPr>
+          </a:p>
+          <a:p>
+            <a:endParaRPr lang="en-US" dirty="0"/>
+          </a:p>
+        </p:txBody>
+      </p:sp>
+      <p:sp>
+        <p:nvSpPr>
+          <p:cNvPr id="7" name="TextBox 6"/>
+          <p:cNvSpPr txBox="1"/>
+          <p:nvPr/>
+        </p:nvSpPr>
+        <p:spPr>
+          <a:xfrm>
+            <a:off x="1442432" y="4703917"/>
+            <a:ext cx="3760631" cy="1494768"/>
+          </a:xfrm>
+          <a:prstGeom prst="rect">
+            <a:avLst/>
+          </a:prstGeom>
+          <a:noFill/>
+        </p:spPr>
+        <p:txBody>
+          <a:bodyPr wrap="square" rtlCol="0">
+            <a:spAutoFit/>
+          </a:bodyPr>
+          <a:lstStyle/>
+          <a:p>
+            <a:pPr marL="685800" lvl="1" indent="-228600">
+              <a:lnSpc>
+                <a:spcPct val="90000"/>
+              </a:lnSpc>
+              <a:spcBef>
+                <a:spcPts val="500"/>
+              </a:spcBef>
+              <a:buFont typeface="Arial" panose="020B0604020202020204" pitchFamily="34" charset="0"/>
+              <a:buChar char="•"/>
+            </a:pPr>
+            <a:r>
+              <a:rPr lang="en-US" sz="2400" dirty="0" err="1">
+                <a:solidFill>
+                  <a:prstClr val="black"/>
+                </a:solidFill>
+              </a:rPr>
+              <a:t>BrowserModule</a:t>
+            </a:r>
+            <a:r>
+              <a:rPr lang="en-US" sz="2400" dirty="0">
+                <a:solidFill>
+                  <a:prstClr val="black"/>
+                </a:solidFill>
+              </a:rPr>
+              <a:t>	</a:t>
+            </a:r>
+          </a:p>
+          <a:p>
+            <a:pPr marL="685800" lvl="1" indent="-228600">
+              <a:lnSpc>
+                <a:spcPct val="90000"/>
+              </a:lnSpc>
+              <a:spcBef>
+                <a:spcPts val="500"/>
+              </a:spcBef>
+              <a:buFont typeface="Arial" panose="020B0604020202020204" pitchFamily="34" charset="0"/>
+              <a:buChar char="•"/>
+            </a:pPr>
+            <a:r>
+              <a:rPr lang="en-US" sz="2400" dirty="0" err="1">
+                <a:solidFill>
+                  <a:prstClr val="black"/>
+                </a:solidFill>
+              </a:rPr>
+              <a:t>CommonModule</a:t>
+            </a:r>
+            <a:endParaRPr lang="en-US" sz="2400" dirty="0">
+              <a:solidFill>
+                <a:prstClr val="black"/>
+              </a:solidFill>
+            </a:endParaRPr>
+          </a:p>
+          <a:p>
+            <a:pPr marL="685800" lvl="1" indent="-228600">
+              <a:lnSpc>
+                <a:spcPct val="90000"/>
+              </a:lnSpc>
+              <a:spcBef>
+                <a:spcPts val="500"/>
+              </a:spcBef>
+              <a:buFont typeface="Arial" panose="020B0604020202020204" pitchFamily="34" charset="0"/>
+              <a:buChar char="•"/>
+            </a:pPr>
+            <a:r>
+              <a:rPr lang="en-US" sz="2400" dirty="0" err="1">
+                <a:solidFill>
+                  <a:prstClr val="black"/>
+                </a:solidFill>
+              </a:rPr>
+              <a:t>FormsModule</a:t>
+            </a:r>
+            <a:endParaRPr lang="en-US" sz="2400" dirty="0">
+              <a:solidFill>
+                <a:prstClr val="black"/>
+              </a:solidFill>
+            </a:endParaRPr>
+          </a:p>
+          <a:p>
+            <a:endParaRPr lang="en-US" dirty="0"/>
+          </a:p>
+        </p:txBody>
+      </p:sp>
+    </p:spTree>
+    <p:extLst>
+      <p:ext uri="{BB962C8B-B14F-4D97-AF65-F5344CB8AC3E}">
+        <p14:creationId xmlns:p14="http://schemas.microsoft.com/office/powerpoint/2010/main" val="803843864"/>
       </p:ext>
     </p:extLst>
   </p:cSld>

</xml_diff>